<commit_message>
Updated architecture with new kaggle dataset
</commit_message>
<xml_diff>
--- a/docs/ArchitectureDesign.pptx
+++ b/docs/ArchitectureDesign.pptx
@@ -104,6 +104,11 @@
       </a:defRPr>
     </a:lvl9pPr>
   </p:defaultTextStyle>
+  <p:extLst>
+    <p:ext uri="{EFAFB233-063F-42B5-8137-9DF3F51BA10A}">
+      <p15:sldGuideLst xmlns:p15="http://schemas.microsoft.com/office/powerpoint/2012/main"/>
+    </p:ext>
+  </p:extLst>
 </p:presentation>
 </file>
 
@@ -254,7 +259,7 @@
           <a:p>
             <a:fld id="{C7A713E2-0102-C64E-A861-86117F15BFC4}" type="datetimeFigureOut">
               <a:rPr lang="en-US" smtClean="0"/>
-              <a:t>3/6/22</a:t>
+              <a:t>3/10/22</a:t>
             </a:fld>
             <a:endParaRPr lang="en-US"/>
           </a:p>
@@ -452,7 +457,7 @@
           <a:p>
             <a:fld id="{C7A713E2-0102-C64E-A861-86117F15BFC4}" type="datetimeFigureOut">
               <a:rPr lang="en-US" smtClean="0"/>
-              <a:t>3/6/22</a:t>
+              <a:t>3/10/22</a:t>
             </a:fld>
             <a:endParaRPr lang="en-US"/>
           </a:p>
@@ -660,7 +665,7 @@
           <a:p>
             <a:fld id="{C7A713E2-0102-C64E-A861-86117F15BFC4}" type="datetimeFigureOut">
               <a:rPr lang="en-US" smtClean="0"/>
-              <a:t>3/6/22</a:t>
+              <a:t>3/10/22</a:t>
             </a:fld>
             <a:endParaRPr lang="en-US"/>
           </a:p>
@@ -858,7 +863,7 @@
           <a:p>
             <a:fld id="{C7A713E2-0102-C64E-A861-86117F15BFC4}" type="datetimeFigureOut">
               <a:rPr lang="en-US" smtClean="0"/>
-              <a:t>3/6/22</a:t>
+              <a:t>3/10/22</a:t>
             </a:fld>
             <a:endParaRPr lang="en-US"/>
           </a:p>
@@ -1133,7 +1138,7 @@
           <a:p>
             <a:fld id="{C7A713E2-0102-C64E-A861-86117F15BFC4}" type="datetimeFigureOut">
               <a:rPr lang="en-US" smtClean="0"/>
-              <a:t>3/6/22</a:t>
+              <a:t>3/10/22</a:t>
             </a:fld>
             <a:endParaRPr lang="en-US"/>
           </a:p>
@@ -1398,7 +1403,7 @@
           <a:p>
             <a:fld id="{C7A713E2-0102-C64E-A861-86117F15BFC4}" type="datetimeFigureOut">
               <a:rPr lang="en-US" smtClean="0"/>
-              <a:t>3/6/22</a:t>
+              <a:t>3/10/22</a:t>
             </a:fld>
             <a:endParaRPr lang="en-US"/>
           </a:p>
@@ -1810,7 +1815,7 @@
           <a:p>
             <a:fld id="{C7A713E2-0102-C64E-A861-86117F15BFC4}" type="datetimeFigureOut">
               <a:rPr lang="en-US" smtClean="0"/>
-              <a:t>3/6/22</a:t>
+              <a:t>3/10/22</a:t>
             </a:fld>
             <a:endParaRPr lang="en-US"/>
           </a:p>
@@ -1951,7 +1956,7 @@
           <a:p>
             <a:fld id="{C7A713E2-0102-C64E-A861-86117F15BFC4}" type="datetimeFigureOut">
               <a:rPr lang="en-US" smtClean="0"/>
-              <a:t>3/6/22</a:t>
+              <a:t>3/10/22</a:t>
             </a:fld>
             <a:endParaRPr lang="en-US"/>
           </a:p>
@@ -2064,7 +2069,7 @@
           <a:p>
             <a:fld id="{C7A713E2-0102-C64E-A861-86117F15BFC4}" type="datetimeFigureOut">
               <a:rPr lang="en-US" smtClean="0"/>
-              <a:t>3/6/22</a:t>
+              <a:t>3/10/22</a:t>
             </a:fld>
             <a:endParaRPr lang="en-US"/>
           </a:p>
@@ -2375,7 +2380,7 @@
           <a:p>
             <a:fld id="{C7A713E2-0102-C64E-A861-86117F15BFC4}" type="datetimeFigureOut">
               <a:rPr lang="en-US" smtClean="0"/>
-              <a:t>3/6/22</a:t>
+              <a:t>3/10/22</a:t>
             </a:fld>
             <a:endParaRPr lang="en-US"/>
           </a:p>
@@ -2663,7 +2668,7 @@
           <a:p>
             <a:fld id="{C7A713E2-0102-C64E-A861-86117F15BFC4}" type="datetimeFigureOut">
               <a:rPr lang="en-US" smtClean="0"/>
-              <a:t>3/6/22</a:t>
+              <a:t>3/10/22</a:t>
             </a:fld>
             <a:endParaRPr lang="en-US"/>
           </a:p>
@@ -2904,7 +2909,7 @@
           <a:p>
             <a:fld id="{C7A713E2-0102-C64E-A861-86117F15BFC4}" type="datetimeFigureOut">
               <a:rPr lang="en-US" smtClean="0"/>
-              <a:t>3/6/22</a:t>
+              <a:t>3/10/22</a:t>
             </a:fld>
             <a:endParaRPr lang="en-US"/>
           </a:p>
@@ -3364,7 +3369,11 @@
           <a:p>
             <a:pPr algn="ctr"/>
             <a:r>
-              <a:rPr lang="en-US" sz="1400" dirty="0"/>
+              <a:rPr lang="en-US" sz="1400" dirty="0">
+                <a:solidFill>
+                  <a:schemeClr val="accent6"/>
+                </a:solidFill>
+              </a:rPr>
               <a:t>Paper</a:t>
             </a:r>
           </a:p>
@@ -3372,10 +3381,10 @@
       </p:sp>
       <p:sp>
         <p:nvSpPr>
-          <p:cNvPr id="5" name="Oval 4">
-            <a:extLst>
-              <a:ext uri="{FF2B5EF4-FFF2-40B4-BE49-F238E27FC236}">
-                <a16:creationId xmlns:a16="http://schemas.microsoft.com/office/drawing/2014/main" id="{11E3FD16-A4AE-C346-A488-792435AB1DDB}"/>
+          <p:cNvPr id="6" name="Oval 5">
+            <a:extLst>
+              <a:ext uri="{FF2B5EF4-FFF2-40B4-BE49-F238E27FC236}">
+                <a16:creationId xmlns:a16="http://schemas.microsoft.com/office/drawing/2014/main" id="{0BFE3B6B-DB46-6D4C-B3BB-B9812DB7826F}"/>
               </a:ext>
             </a:extLst>
           </p:cNvPr>
@@ -3384,8 +3393,8 @@
         </p:nvSpPr>
         <p:spPr>
           <a:xfrm>
-            <a:off x="5675587" y="712432"/>
-            <a:ext cx="1546724" cy="1546724"/>
+            <a:off x="6792239" y="3429000"/>
+            <a:ext cx="1828800" cy="1639258"/>
           </a:xfrm>
           <a:prstGeom prst="ellipse">
             <a:avLst/>
@@ -3414,17 +3423,29 @@
             <a:pPr algn="ctr"/>
             <a:r>
               <a:rPr lang="en-US" sz="1400" dirty="0"/>
-              <a:t>Proceeding</a:t>
-            </a:r>
-          </a:p>
-        </p:txBody>
-      </p:sp>
-      <p:sp>
-        <p:nvSpPr>
-          <p:cNvPr id="6" name="Oval 5">
-            <a:extLst>
-              <a:ext uri="{FF2B5EF4-FFF2-40B4-BE49-F238E27FC236}">
-                <a16:creationId xmlns:a16="http://schemas.microsoft.com/office/drawing/2014/main" id="{0BFE3B6B-DB46-6D4C-B3BB-B9812DB7826F}"/>
+              <a:t>Journal</a:t>
+            </a:r>
+            <a:br>
+              <a:rPr lang="en-US" sz="1400" dirty="0"/>
+            </a:br>
+            <a:r>
+              <a:rPr lang="en-US" sz="1400" dirty="0"/>
+              <a:t>–</a:t>
+            </a:r>
+            <a:r>
+              <a:rPr lang="en-US" sz="1400" dirty="0" err="1"/>
+              <a:t>source_title</a:t>
+            </a:r>
+            <a:endParaRPr lang="en-US" sz="1400" dirty="0"/>
+          </a:p>
+        </p:txBody>
+      </p:sp>
+      <p:sp>
+        <p:nvSpPr>
+          <p:cNvPr id="7" name="Oval 6">
+            <a:extLst>
+              <a:ext uri="{FF2B5EF4-FFF2-40B4-BE49-F238E27FC236}">
+                <a16:creationId xmlns:a16="http://schemas.microsoft.com/office/drawing/2014/main" id="{68B9BAA5-C552-F74A-A7A8-436B5D066A91}"/>
               </a:ext>
             </a:extLst>
           </p:cNvPr>
@@ -3433,8 +3454,8 @@
         </p:nvSpPr>
         <p:spPr>
           <a:xfrm>
-            <a:off x="6792239" y="3429000"/>
-            <a:ext cx="1260389" cy="1260389"/>
+            <a:off x="8368077" y="0"/>
+            <a:ext cx="1878771" cy="1789743"/>
           </a:xfrm>
           <a:prstGeom prst="ellipse">
             <a:avLst/>
@@ -3463,17 +3484,29 @@
             <a:pPr algn="ctr"/>
             <a:r>
               <a:rPr lang="en-US" sz="1400" dirty="0"/>
-              <a:t>Journal</a:t>
-            </a:r>
-          </a:p>
-        </p:txBody>
-      </p:sp>
-      <p:sp>
-        <p:nvSpPr>
-          <p:cNvPr id="7" name="Oval 6">
-            <a:extLst>
-              <a:ext uri="{FF2B5EF4-FFF2-40B4-BE49-F238E27FC236}">
-                <a16:creationId xmlns:a16="http://schemas.microsoft.com/office/drawing/2014/main" id="{68B9BAA5-C552-F74A-A7A8-436B5D066A91}"/>
+              <a:t>Conference series</a:t>
+            </a:r>
+          </a:p>
+          <a:p>
+            <a:pPr algn="ctr"/>
+            <a:r>
+              <a:rPr lang="en-US" sz="1400" dirty="0"/>
+              <a:t>-</a:t>
+            </a:r>
+            <a:r>
+              <a:rPr lang="en-US" sz="1400" dirty="0" err="1"/>
+              <a:t>source_title</a:t>
+            </a:r>
+            <a:endParaRPr lang="en-US" sz="1400" dirty="0"/>
+          </a:p>
+        </p:txBody>
+      </p:sp>
+      <p:sp>
+        <p:nvSpPr>
+          <p:cNvPr id="8" name="Oval 7">
+            <a:extLst>
+              <a:ext uri="{FF2B5EF4-FFF2-40B4-BE49-F238E27FC236}">
+                <a16:creationId xmlns:a16="http://schemas.microsoft.com/office/drawing/2014/main" id="{3D2CC32B-1A11-7045-821F-319D5A609E93}"/>
               </a:ext>
             </a:extLst>
           </p:cNvPr>
@@ -3482,8 +3515,8 @@
         </p:nvSpPr>
         <p:spPr>
           <a:xfrm>
-            <a:off x="8368078" y="286337"/>
-            <a:ext cx="1503406" cy="1503406"/>
+            <a:off x="9931593" y="2362589"/>
+            <a:ext cx="1624916" cy="1438248"/>
           </a:xfrm>
           <a:prstGeom prst="ellipse">
             <a:avLst/>
@@ -3512,154 +3545,7 @@
             <a:pPr algn="ctr"/>
             <a:r>
               <a:rPr lang="en-US" sz="1400" dirty="0"/>
-              <a:t>Conference/ Workshop</a:t>
-            </a:r>
-          </a:p>
-        </p:txBody>
-      </p:sp>
-      <p:sp>
-        <p:nvSpPr>
-          <p:cNvPr id="8" name="Oval 7">
-            <a:extLst>
-              <a:ext uri="{FF2B5EF4-FFF2-40B4-BE49-F238E27FC236}">
-                <a16:creationId xmlns:a16="http://schemas.microsoft.com/office/drawing/2014/main" id="{3D2CC32B-1A11-7045-821F-319D5A609E93}"/>
-              </a:ext>
-            </a:extLst>
-          </p:cNvPr>
-          <p:cNvSpPr/>
-          <p:nvPr/>
-        </p:nvSpPr>
-        <p:spPr>
-          <a:xfrm>
-            <a:off x="8621039" y="2400194"/>
-            <a:ext cx="1260389" cy="1260389"/>
-          </a:xfrm>
-          <a:prstGeom prst="ellipse">
-            <a:avLst/>
-          </a:prstGeom>
-        </p:spPr>
-        <p:style>
-          <a:lnRef idx="2">
-            <a:schemeClr val="accent1">
-              <a:shade val="50000"/>
-            </a:schemeClr>
-          </a:lnRef>
-          <a:fillRef idx="1">
-            <a:schemeClr val="accent1"/>
-          </a:fillRef>
-          <a:effectRef idx="0">
-            <a:schemeClr val="accent1"/>
-          </a:effectRef>
-          <a:fontRef idx="minor">
-            <a:schemeClr val="lt1"/>
-          </a:fontRef>
-        </p:style>
-        <p:txBody>
-          <a:bodyPr rtlCol="0" anchor="ctr"/>
-          <a:lstStyle/>
-          <a:p>
-            <a:pPr algn="ctr"/>
-            <a:r>
-              <a:rPr lang="en-US" sz="1400" dirty="0"/>
-              <a:t>Date Range</a:t>
-            </a:r>
-          </a:p>
-        </p:txBody>
-      </p:sp>
-      <p:sp>
-        <p:nvSpPr>
-          <p:cNvPr id="9" name="Oval 8">
-            <a:extLst>
-              <a:ext uri="{FF2B5EF4-FFF2-40B4-BE49-F238E27FC236}">
-                <a16:creationId xmlns:a16="http://schemas.microsoft.com/office/drawing/2014/main" id="{DC9DA62D-F8B3-F743-8C35-63E0AD39700D}"/>
-              </a:ext>
-            </a:extLst>
-          </p:cNvPr>
-          <p:cNvSpPr/>
-          <p:nvPr/>
-        </p:nvSpPr>
-        <p:spPr>
-          <a:xfrm>
-            <a:off x="9992993" y="1485794"/>
-            <a:ext cx="1260389" cy="1260389"/>
-          </a:xfrm>
-          <a:prstGeom prst="ellipse">
-            <a:avLst/>
-          </a:prstGeom>
-        </p:spPr>
-        <p:style>
-          <a:lnRef idx="2">
-            <a:schemeClr val="accent1">
-              <a:shade val="50000"/>
-            </a:schemeClr>
-          </a:lnRef>
-          <a:fillRef idx="1">
-            <a:schemeClr val="accent1"/>
-          </a:fillRef>
-          <a:effectRef idx="0">
-            <a:schemeClr val="accent1"/>
-          </a:effectRef>
-          <a:fontRef idx="minor">
-            <a:schemeClr val="lt1"/>
-          </a:fontRef>
-        </p:style>
-        <p:txBody>
-          <a:bodyPr rtlCol="0" anchor="ctr"/>
-          <a:lstStyle/>
-          <a:p>
-            <a:pPr algn="ctr"/>
-            <a:r>
-              <a:rPr lang="en-US" sz="1400" dirty="0"/>
-              <a:t>City</a:t>
-            </a:r>
-          </a:p>
-        </p:txBody>
-      </p:sp>
-      <p:sp>
-        <p:nvSpPr>
-          <p:cNvPr id="10" name="Oval 9">
-            <a:extLst>
-              <a:ext uri="{FF2B5EF4-FFF2-40B4-BE49-F238E27FC236}">
-                <a16:creationId xmlns:a16="http://schemas.microsoft.com/office/drawing/2014/main" id="{DD0AF7F3-705E-0944-8253-24E40B83A95E}"/>
-              </a:ext>
-            </a:extLst>
-          </p:cNvPr>
-          <p:cNvSpPr/>
-          <p:nvPr/>
-        </p:nvSpPr>
-        <p:spPr>
-          <a:xfrm>
-            <a:off x="7859392" y="4925090"/>
-            <a:ext cx="1260389" cy="1260389"/>
-          </a:xfrm>
-          <a:prstGeom prst="ellipse">
-            <a:avLst/>
-          </a:prstGeom>
-        </p:spPr>
-        <p:style>
-          <a:lnRef idx="2">
-            <a:schemeClr val="accent1">
-              <a:shade val="50000"/>
-            </a:schemeClr>
-          </a:lnRef>
-          <a:fillRef idx="1">
-            <a:schemeClr val="accent1"/>
-          </a:fillRef>
-          <a:effectRef idx="0">
-            <a:schemeClr val="accent1"/>
-          </a:effectRef>
-          <a:fontRef idx="minor">
-            <a:schemeClr val="lt1"/>
-          </a:fontRef>
-        </p:style>
-        <p:txBody>
-          <a:bodyPr rtlCol="0" anchor="ctr"/>
-          <a:lstStyle/>
-          <a:p>
-            <a:pPr algn="ctr"/>
-            <a:r>
-              <a:rPr lang="en-US" sz="1400" dirty="0"/>
-              <a:t>Volume</a:t>
+              <a:t>Conference year</a:t>
             </a:r>
           </a:p>
         </p:txBody>
@@ -3707,7 +3593,11 @@
           <a:p>
             <a:pPr algn="ctr"/>
             <a:r>
-              <a:rPr lang="en-US" sz="1400" dirty="0"/>
+              <a:rPr lang="en-US" sz="1400" dirty="0">
+                <a:solidFill>
+                  <a:schemeClr val="accent6"/>
+                </a:solidFill>
+              </a:rPr>
               <a:t>Keywords</a:t>
             </a:r>
           </a:p>
@@ -3762,48 +3652,6 @@
           </a:p>
         </p:txBody>
       </p:sp>
-      <p:cxnSp>
-        <p:nvCxnSpPr>
-          <p:cNvPr id="14" name="Straight Arrow Connector 13">
-            <a:extLst>
-              <a:ext uri="{FF2B5EF4-FFF2-40B4-BE49-F238E27FC236}">
-                <a16:creationId xmlns:a16="http://schemas.microsoft.com/office/drawing/2014/main" id="{0D7B67D7-FA0D-2C45-A200-918EFA5A7763}"/>
-              </a:ext>
-            </a:extLst>
-          </p:cNvPr>
-          <p:cNvCxnSpPr>
-            <a:stCxn id="5" idx="3"/>
-            <a:endCxn id="4" idx="7"/>
-          </p:cNvCxnSpPr>
-          <p:nvPr/>
-        </p:nvCxnSpPr>
-        <p:spPr>
-          <a:xfrm flipH="1">
-            <a:off x="4769056" y="2032644"/>
-            <a:ext cx="1133043" cy="814461"/>
-          </a:xfrm>
-          <a:prstGeom prst="straightConnector1">
-            <a:avLst/>
-          </a:prstGeom>
-          <a:ln>
-            <a:tailEnd type="triangle"/>
-          </a:ln>
-        </p:spPr>
-        <p:style>
-          <a:lnRef idx="1">
-            <a:schemeClr val="accent1"/>
-          </a:lnRef>
-          <a:fillRef idx="0">
-            <a:schemeClr val="accent1"/>
-          </a:fillRef>
-          <a:effectRef idx="0">
-            <a:schemeClr val="accent1"/>
-          </a:effectRef>
-          <a:fontRef idx="minor">
-            <a:schemeClr val="tx1"/>
-          </a:fontRef>
-        </p:style>
-      </p:cxnSp>
       <p:cxnSp>
         <p:nvCxnSpPr>
           <p:cNvPr id="15" name="Straight Arrow Connector 14">
@@ -3955,50 +3803,7 @@
         <p:spPr>
           <a:xfrm flipH="1" flipV="1">
             <a:off x="4953636" y="3292720"/>
-            <a:ext cx="1838603" cy="766475"/>
-          </a:xfrm>
-          <a:prstGeom prst="straightConnector1">
-            <a:avLst/>
-          </a:prstGeom>
-          <a:ln>
-            <a:tailEnd type="triangle"/>
-          </a:ln>
-        </p:spPr>
-        <p:style>
-          <a:lnRef idx="1">
-            <a:schemeClr val="accent1"/>
-          </a:lnRef>
-          <a:fillRef idx="0">
-            <a:schemeClr val="accent1"/>
-          </a:fillRef>
-          <a:effectRef idx="0">
-            <a:schemeClr val="accent1"/>
-          </a:effectRef>
-          <a:fontRef idx="minor">
-            <a:schemeClr val="tx1"/>
-          </a:fontRef>
-        </p:style>
-      </p:cxnSp>
-      <p:cxnSp>
-        <p:nvCxnSpPr>
-          <p:cNvPr id="54" name="Straight Arrow Connector 53">
-            <a:extLst>
-              <a:ext uri="{FF2B5EF4-FFF2-40B4-BE49-F238E27FC236}">
-                <a16:creationId xmlns:a16="http://schemas.microsoft.com/office/drawing/2014/main" id="{881EFA87-8E44-0B44-BD51-4EA92156B587}"/>
-              </a:ext>
-            </a:extLst>
-          </p:cNvPr>
-          <p:cNvCxnSpPr>
-            <a:cxnSpLocks/>
-            <a:stCxn id="10" idx="1"/>
-            <a:endCxn id="6" idx="5"/>
-          </p:cNvCxnSpPr>
-          <p:nvPr/>
-        </p:nvCxnSpPr>
-        <p:spPr>
-          <a:xfrm flipH="1" flipV="1">
-            <a:off x="7868048" y="4504809"/>
-            <a:ext cx="175924" cy="604861"/>
+            <a:ext cx="1838603" cy="955909"/>
           </a:xfrm>
           <a:prstGeom prst="straightConnector1">
             <a:avLst/>
@@ -4034,57 +3839,14 @@
           <p:cNvCxnSpPr>
             <a:cxnSpLocks/>
             <a:stCxn id="8" idx="0"/>
-            <a:endCxn id="7" idx="4"/>
-          </p:cNvCxnSpPr>
-          <p:nvPr/>
-        </p:nvCxnSpPr>
-        <p:spPr>
-          <a:xfrm flipH="1" flipV="1">
-            <a:off x="9119781" y="1789743"/>
-            <a:ext cx="131453" cy="610451"/>
-          </a:xfrm>
-          <a:prstGeom prst="straightConnector1">
-            <a:avLst/>
-          </a:prstGeom>
-          <a:ln>
-            <a:tailEnd type="triangle"/>
-          </a:ln>
-        </p:spPr>
-        <p:style>
-          <a:lnRef idx="1">
-            <a:schemeClr val="accent1"/>
-          </a:lnRef>
-          <a:fillRef idx="0">
-            <a:schemeClr val="accent1"/>
-          </a:fillRef>
-          <a:effectRef idx="0">
-            <a:schemeClr val="accent1"/>
-          </a:effectRef>
-          <a:fontRef idx="minor">
-            <a:schemeClr val="tx1"/>
-          </a:fontRef>
-        </p:style>
-      </p:cxnSp>
-      <p:cxnSp>
-        <p:nvCxnSpPr>
-          <p:cNvPr id="61" name="Straight Arrow Connector 60">
-            <a:extLst>
-              <a:ext uri="{FF2B5EF4-FFF2-40B4-BE49-F238E27FC236}">
-                <a16:creationId xmlns:a16="http://schemas.microsoft.com/office/drawing/2014/main" id="{EA5B0DE0-15BA-8A48-BEAB-30754528A866}"/>
-              </a:ext>
-            </a:extLst>
-          </p:cNvPr>
-          <p:cNvCxnSpPr>
-            <a:cxnSpLocks/>
-            <a:stCxn id="9" idx="1"/>
             <a:endCxn id="7" idx="5"/>
           </p:cNvCxnSpPr>
           <p:nvPr/>
         </p:nvCxnSpPr>
         <p:spPr>
           <a:xfrm flipH="1" flipV="1">
-            <a:off x="9651315" y="1569574"/>
-            <a:ext cx="526258" cy="100800"/>
+            <a:off x="9971708" y="1527641"/>
+            <a:ext cx="772343" cy="834948"/>
           </a:xfrm>
           <a:prstGeom prst="straightConnector1">
             <a:avLst/>
@@ -4120,14 +3882,14 @@
           <p:cNvCxnSpPr>
             <a:cxnSpLocks/>
             <a:stCxn id="7" idx="2"/>
-            <a:endCxn id="5" idx="6"/>
+            <a:endCxn id="4" idx="7"/>
           </p:cNvCxnSpPr>
           <p:nvPr/>
         </p:nvCxnSpPr>
         <p:spPr>
           <a:xfrm flipH="1">
-            <a:off x="7222311" y="1038040"/>
-            <a:ext cx="1145767" cy="447754"/>
+            <a:off x="4769056" y="894872"/>
+            <a:ext cx="3599021" cy="1952233"/>
           </a:xfrm>
           <a:prstGeom prst="straightConnector1">
             <a:avLst/>
@@ -4200,8 +3962,8 @@
         </p:nvSpPr>
         <p:spPr>
           <a:xfrm>
-            <a:off x="5434024" y="3579368"/>
-            <a:ext cx="728020" cy="523220"/>
+            <a:off x="5514807" y="3919779"/>
+            <a:ext cx="1107051" cy="954107"/>
           </a:xfrm>
           <a:prstGeom prst="rect">
             <a:avLst/>
@@ -4209,21 +3971,21 @@
           <a:noFill/>
         </p:spPr>
         <p:txBody>
-          <a:bodyPr wrap="none" rtlCol="0">
+          <a:bodyPr wrap="square" rtlCol="0">
             <a:spAutoFit/>
           </a:bodyPr>
           <a:lstStyle/>
           <a:p>
             <a:r>
               <a:rPr lang="en-US" sz="1400" dirty="0"/>
-              <a:t>Year,</a:t>
+              <a:t>Publishing Year,</a:t>
             </a:r>
             <a:br>
               <a:rPr lang="en-US" sz="1400" dirty="0"/>
             </a:br>
             <a:r>
               <a:rPr lang="en-US" sz="1400" dirty="0"/>
-              <a:t>volume</a:t>
+              <a:t>volume, issue</a:t>
             </a:r>
           </a:p>
         </p:txBody>
@@ -4242,8 +4004,8 @@
         </p:nvSpPr>
         <p:spPr>
           <a:xfrm>
-            <a:off x="5311347" y="2345582"/>
-            <a:ext cx="702436" cy="523220"/>
+            <a:off x="5618269" y="1073591"/>
+            <a:ext cx="1003589" cy="971078"/>
           </a:xfrm>
           <a:prstGeom prst="rect">
             <a:avLst/>
@@ -4251,21 +4013,14 @@
           <a:noFill/>
         </p:spPr>
         <p:txBody>
-          <a:bodyPr wrap="none" rtlCol="0">
+          <a:bodyPr wrap="square" rtlCol="0">
             <a:spAutoFit/>
           </a:bodyPr>
           <a:lstStyle/>
           <a:p>
             <a:r>
               <a:rPr lang="en-US" sz="1400" dirty="0"/>
-              <a:t>Year,</a:t>
-            </a:r>
-            <a:br>
-              <a:rPr lang="en-US" sz="1400" dirty="0"/>
-            </a:br>
-            <a:r>
-              <a:rPr lang="en-US" sz="1400" dirty="0"/>
-              <a:t>edition</a:t>
+              <a:t>Publishing year, volume, issue</a:t>
             </a:r>
           </a:p>
         </p:txBody>
@@ -4285,7 +4040,7 @@
         <p:spPr>
           <a:xfrm>
             <a:off x="3395027" y="1073591"/>
-            <a:ext cx="1455122" cy="738664"/>
+            <a:ext cx="1455122" cy="523220"/>
           </a:xfrm>
           <a:prstGeom prst="rect">
             <a:avLst/>
@@ -4300,7 +4055,62 @@
           <a:p>
             <a:r>
               <a:rPr lang="en-US" sz="1400" dirty="0"/>
-              <a:t>Reviewer, corresponding, contributor</a:t>
+              <a:t>Contributor,</a:t>
+            </a:r>
+          </a:p>
+          <a:p>
+            <a:r>
+              <a:rPr lang="en-US" sz="1400" dirty="0"/>
+              <a:t>Reviewer</a:t>
+            </a:r>
+          </a:p>
+        </p:txBody>
+      </p:sp>
+      <p:sp>
+        <p:nvSpPr>
+          <p:cNvPr id="43" name="Oval 42">
+            <a:extLst>
+              <a:ext uri="{FF2B5EF4-FFF2-40B4-BE49-F238E27FC236}">
+                <a16:creationId xmlns:a16="http://schemas.microsoft.com/office/drawing/2014/main" id="{31F8EED3-57F5-A841-B5BD-62B7F632D1F6}"/>
+              </a:ext>
+            </a:extLst>
+          </p:cNvPr>
+          <p:cNvSpPr/>
+          <p:nvPr/>
+        </p:nvSpPr>
+        <p:spPr>
+          <a:xfrm>
+            <a:off x="723468" y="4987972"/>
+            <a:ext cx="1828800" cy="1639258"/>
+          </a:xfrm>
+          <a:prstGeom prst="ellipse">
+            <a:avLst/>
+          </a:prstGeom>
+        </p:spPr>
+        <p:style>
+          <a:lnRef idx="2">
+            <a:schemeClr val="accent1">
+              <a:shade val="50000"/>
+            </a:schemeClr>
+          </a:lnRef>
+          <a:fillRef idx="1">
+            <a:schemeClr val="accent1"/>
+          </a:fillRef>
+          <a:effectRef idx="0">
+            <a:schemeClr val="accent1"/>
+          </a:effectRef>
+          <a:fontRef idx="minor">
+            <a:schemeClr val="lt1"/>
+          </a:fontRef>
+        </p:style>
+        <p:txBody>
+          <a:bodyPr rtlCol="0" anchor="ctr"/>
+          <a:lstStyle/>
+          <a:p>
+            <a:pPr algn="ctr"/>
+            <a:r>
+              <a:rPr lang="en-US" sz="1400" dirty="0"/>
+              <a:t>Communities?</a:t>
             </a:r>
           </a:p>
         </p:txBody>

</xml_diff>

<commit_message>
Updated with latest architecture
</commit_message>
<xml_diff>
--- a/docs/ArchitectureDesign.pptx
+++ b/docs/ArchitectureDesign.pptx
@@ -3977,7 +3977,11 @@
           <a:lstStyle/>
           <a:p>
             <a:r>
-              <a:rPr lang="en-US" sz="1400" dirty="0"/>
+              <a:rPr lang="en-US" sz="1400" dirty="0">
+                <a:highlight>
+                  <a:srgbClr val="00FFFF"/>
+                </a:highlight>
+              </a:rPr>
               <a:t>Publishing Year,</a:t>
             </a:r>
             <a:br>
@@ -4019,8 +4023,16 @@
           <a:lstStyle/>
           <a:p>
             <a:r>
+              <a:rPr lang="en-US" sz="1400" dirty="0">
+                <a:highlight>
+                  <a:srgbClr val="00FFFF"/>
+                </a:highlight>
+              </a:rPr>
+              <a:t>Publishing year, </a:t>
+            </a:r>
+            <a:r>
               <a:rPr lang="en-US" sz="1400" dirty="0"/>
-              <a:t>Publishing year, volume, issue</a:t>
+              <a:t>volume, issue</a:t>
             </a:r>
           </a:p>
         </p:txBody>

</xml_diff>